<commit_message>
Update gitbook 2025-03-25 15:19:53
</commit_message>
<xml_diff>
--- a/Buttons/Buttons.pptx
+++ b/Buttons/Buttons.pptx
@@ -218,7 +218,7 @@
           <a:p>
             <a:fld id="{19104133-B5B0-4351-8158-4F0E5EB1E2BF}" type="datetimeFigureOut">
               <a:rPr lang="en-US" smtClean="0"/>
-              <a:t>3/24/2023</a:t>
+              <a:t>2/11/2025</a:t>
             </a:fld>
             <a:endParaRPr lang="en-US"/>
           </a:p>
@@ -1968,7 +1968,7 @@
             <a:fld id="{1C2D31DE-C454-491C-B5C3-F097855E3DF7}" type="datetime4">
               <a:rPr lang="en-US" smtClean="0"/>
               <a:pPr/>
-              <a:t>March 24, 2023</a:t>
+              <a:t>February 11, 2025</a:t>
             </a:fld>
             <a:endParaRPr lang="en-US" dirty="0"/>
           </a:p>
@@ -5360,7 +5360,7 @@
           <a:p>
             <a:fld id="{5958763E-B898-436D-883D-03711491D54A}" type="datetimeFigureOut">
               <a:rPr lang="en-US" smtClean="0"/>
-              <a:t>3/24/2023</a:t>
+              <a:t>2/11/2025</a:t>
             </a:fld>
             <a:endParaRPr lang="en-US"/>
           </a:p>
@@ -5553,7 +5553,7 @@
           <a:p>
             <a:fld id="{5958763E-B898-436D-883D-03711491D54A}" type="datetimeFigureOut">
               <a:rPr lang="en-US" smtClean="0"/>
-              <a:t>3/24/2023</a:t>
+              <a:t>2/11/2025</a:t>
             </a:fld>
             <a:endParaRPr lang="en-US"/>
           </a:p>
@@ -5803,7 +5803,7 @@
           <a:p>
             <a:fld id="{5958763E-B898-436D-883D-03711491D54A}" type="datetimeFigureOut">
               <a:rPr lang="en-US" smtClean="0"/>
-              <a:t>3/24/2023</a:t>
+              <a:t>2/11/2025</a:t>
             </a:fld>
             <a:endParaRPr lang="en-US"/>
           </a:p>
@@ -6151,7 +6151,7 @@
           <a:p>
             <a:fld id="{5958763E-B898-436D-883D-03711491D54A}" type="datetimeFigureOut">
               <a:rPr lang="en-US" smtClean="0"/>
-              <a:t>3/24/2023</a:t>
+              <a:t>2/11/2025</a:t>
             </a:fld>
             <a:endParaRPr lang="en-US"/>
           </a:p>
@@ -6567,7 +6567,7 @@
           <a:p>
             <a:fld id="{5958763E-B898-436D-883D-03711491D54A}" type="datetimeFigureOut">
               <a:rPr lang="en-US" smtClean="0"/>
-              <a:t>3/24/2023</a:t>
+              <a:t>2/11/2025</a:t>
             </a:fld>
             <a:endParaRPr lang="en-US"/>
           </a:p>
@@ -7068,7 +7068,7 @@
           <a:p>
             <a:fld id="{5958763E-B898-436D-883D-03711491D54A}" type="datetimeFigureOut">
               <a:rPr lang="en-US" smtClean="0"/>
-              <a:t>3/24/2023</a:t>
+              <a:t>2/11/2025</a:t>
             </a:fld>
             <a:endParaRPr lang="en-US"/>
           </a:p>
@@ -7519,7 +7519,7 @@
           <a:p>
             <a:fld id="{5958763E-B898-436D-883D-03711491D54A}" type="datetimeFigureOut">
               <a:rPr lang="en-US" smtClean="0"/>
-              <a:t>3/24/2023</a:t>
+              <a:t>2/11/2025</a:t>
             </a:fld>
             <a:endParaRPr lang="en-US"/>
           </a:p>
@@ -8130,7 +8130,7 @@
           <a:p>
             <a:fld id="{5958763E-B898-436D-883D-03711491D54A}" type="datetimeFigureOut">
               <a:rPr lang="en-US" smtClean="0"/>
-              <a:t>3/24/2023</a:t>
+              <a:t>2/11/2025</a:t>
             </a:fld>
             <a:endParaRPr lang="en-US"/>
           </a:p>
@@ -8901,7 +8901,7 @@
           <a:p>
             <a:fld id="{5958763E-B898-436D-883D-03711491D54A}" type="datetimeFigureOut">
               <a:rPr lang="en-US" smtClean="0"/>
-              <a:t>3/24/2023</a:t>
+              <a:t>2/11/2025</a:t>
             </a:fld>
             <a:endParaRPr lang="en-US"/>
           </a:p>
@@ -9005,7 +9005,7 @@
           <a:p>
             <a:fld id="{5958763E-B898-436D-883D-03711491D54A}" type="datetimeFigureOut">
               <a:rPr lang="en-US" smtClean="0"/>
-              <a:t>3/24/2023</a:t>
+              <a:t>2/11/2025</a:t>
             </a:fld>
             <a:endParaRPr lang="en-US"/>
           </a:p>
@@ -9332,7 +9332,7 @@
             <a:fld id="{1C2D31DE-C454-491C-B5C3-F097855E3DF7}" type="datetime4">
               <a:rPr lang="en-US" smtClean="0"/>
               <a:pPr/>
-              <a:t>March 24, 2023</a:t>
+              <a:t>February 11, 2025</a:t>
             </a:fld>
             <a:endParaRPr lang="en-US" dirty="0"/>
           </a:p>
@@ -12484,7 +12484,7 @@
           <a:p>
             <a:fld id="{5958763E-B898-436D-883D-03711491D54A}" type="datetimeFigureOut">
               <a:rPr lang="en-US" smtClean="0"/>
-              <a:t>3/24/2023</a:t>
+              <a:t>2/11/2025</a:t>
             </a:fld>
             <a:endParaRPr lang="en-US"/>
           </a:p>
@@ -12608,7 +12608,7 @@
           <a:p>
             <a:fld id="{5958763E-B898-436D-883D-03711491D54A}" type="datetimeFigureOut">
               <a:rPr lang="en-US" smtClean="0"/>
-              <a:t>3/24/2023</a:t>
+              <a:t>2/11/2025</a:t>
             </a:fld>
             <a:endParaRPr lang="en-US"/>
           </a:p>
@@ -12732,7 +12732,7 @@
           <a:p>
             <a:fld id="{5958763E-B898-436D-883D-03711491D54A}" type="datetimeFigureOut">
               <a:rPr lang="en-US" smtClean="0"/>
-              <a:t>3/24/2023</a:t>
+              <a:t>2/11/2025</a:t>
             </a:fld>
             <a:endParaRPr lang="en-US"/>
           </a:p>
@@ -12856,7 +12856,7 @@
           <a:p>
             <a:fld id="{5958763E-B898-436D-883D-03711491D54A}" type="datetimeFigureOut">
               <a:rPr lang="en-US" smtClean="0"/>
-              <a:t>3/24/2023</a:t>
+              <a:t>2/11/2025</a:t>
             </a:fld>
             <a:endParaRPr lang="en-US"/>
           </a:p>
@@ -12980,7 +12980,7 @@
           <a:p>
             <a:fld id="{5958763E-B898-436D-883D-03711491D54A}" type="datetimeFigureOut">
               <a:rPr lang="en-US" smtClean="0"/>
-              <a:t>3/24/2023</a:t>
+              <a:t>2/11/2025</a:t>
             </a:fld>
             <a:endParaRPr lang="en-US"/>
           </a:p>
@@ -13104,7 +13104,7 @@
           <a:p>
             <a:fld id="{5958763E-B898-436D-883D-03711491D54A}" type="datetimeFigureOut">
               <a:rPr lang="en-US" smtClean="0"/>
-              <a:t>3/24/2023</a:t>
+              <a:t>2/11/2025</a:t>
             </a:fld>
             <a:endParaRPr lang="en-US"/>
           </a:p>
@@ -13228,7 +13228,7 @@
           <a:p>
             <a:fld id="{5958763E-B898-436D-883D-03711491D54A}" type="datetimeFigureOut">
               <a:rPr lang="en-US" smtClean="0"/>
-              <a:t>3/24/2023</a:t>
+              <a:t>2/11/2025</a:t>
             </a:fld>
             <a:endParaRPr lang="en-US"/>
           </a:p>
@@ -13352,7 +13352,7 @@
           <a:p>
             <a:fld id="{5958763E-B898-436D-883D-03711491D54A}" type="datetimeFigureOut">
               <a:rPr lang="en-US" smtClean="0"/>
-              <a:t>3/24/2023</a:t>
+              <a:t>2/11/2025</a:t>
             </a:fld>
             <a:endParaRPr lang="en-US"/>
           </a:p>
@@ -13485,7 +13485,7 @@
           <a:p>
             <a:fld id="{5958763E-B898-436D-883D-03711491D54A}" type="datetimeFigureOut">
               <a:rPr lang="en-US" smtClean="0"/>
-              <a:t>3/24/2023</a:t>
+              <a:t>2/11/2025</a:t>
             </a:fld>
             <a:endParaRPr lang="en-US"/>
           </a:p>
@@ -16824,7 +16824,7 @@
             <a:fld id="{1C2D31DE-C454-491C-B5C3-F097855E3DF7}" type="datetime4">
               <a:rPr lang="en-US" smtClean="0"/>
               <a:pPr/>
-              <a:t>March 24, 2023</a:t>
+              <a:t>February 11, 2025</a:t>
             </a:fld>
             <a:endParaRPr lang="en-US" dirty="0"/>
           </a:p>
@@ -29060,7 +29060,7 @@
           <a:p>
             <a:fld id="{5958763E-B898-436D-883D-03711491D54A}" type="datetimeFigureOut">
               <a:rPr lang="en-US" smtClean="0"/>
-              <a:t>3/24/2023</a:t>
+              <a:t>2/11/2025</a:t>
             </a:fld>
             <a:endParaRPr lang="en-US"/>
           </a:p>
@@ -29462,7 +29462,7 @@
           <a:p>
             <a:fld id="{5958763E-B898-436D-883D-03711491D54A}" type="datetimeFigureOut">
               <a:rPr lang="en-US" smtClean="0"/>
-              <a:t>3/24/2023</a:t>
+              <a:t>2/11/2025</a:t>
             </a:fld>
             <a:endParaRPr lang="en-US"/>
           </a:p>
@@ -29756,7 +29756,7 @@
           <a:p>
             <a:fld id="{5958763E-B898-436D-883D-03711491D54A}" type="datetimeFigureOut">
               <a:rPr lang="en-US" smtClean="0"/>
-              <a:t>3/24/2023</a:t>
+              <a:t>2/11/2025</a:t>
             </a:fld>
             <a:endParaRPr lang="en-US"/>
           </a:p>
@@ -29957,7 +29957,7 @@
           <a:p>
             <a:fld id="{5958763E-B898-436D-883D-03711491D54A}" type="datetimeFigureOut">
               <a:rPr lang="en-US" smtClean="0"/>
-              <a:t>3/24/2023</a:t>
+              <a:t>2/11/2025</a:t>
             </a:fld>
             <a:endParaRPr lang="en-US"/>
           </a:p>
@@ -30218,7 +30218,7 @@
           <a:p>
             <a:fld id="{5958763E-B898-436D-883D-03711491D54A}" type="datetimeFigureOut">
               <a:rPr lang="en-US" smtClean="0"/>
-              <a:t>3/24/2023</a:t>
+              <a:t>2/11/2025</a:t>
             </a:fld>
             <a:endParaRPr lang="en-US"/>
           </a:p>
@@ -30726,7 +30726,7 @@
           <a:p>
             <a:fld id="{5958763E-B898-436D-883D-03711491D54A}" type="datetimeFigureOut">
               <a:rPr lang="en-US" smtClean="0"/>
-              <a:t>3/24/2023</a:t>
+              <a:t>2/11/2025</a:t>
             </a:fld>
             <a:endParaRPr lang="en-US"/>
           </a:p>
@@ -31205,7 +31205,7 @@
           <a:p>
             <a:fld id="{5958763E-B898-436D-883D-03711491D54A}" type="datetimeFigureOut">
               <a:rPr lang="en-US" smtClean="0"/>
-              <a:t>3/24/2023</a:t>
+              <a:t>2/11/2025</a:t>
             </a:fld>
             <a:endParaRPr lang="en-US"/>
           </a:p>
@@ -32024,7 +32024,7 @@
           <a:p>
             <a:fld id="{5958763E-B898-436D-883D-03711491D54A}" type="datetimeFigureOut">
               <a:rPr lang="en-US" smtClean="0"/>
-              <a:t>3/24/2023</a:t>
+              <a:t>2/11/2025</a:t>
             </a:fld>
             <a:endParaRPr lang="en-US"/>
           </a:p>
@@ -32225,7 +32225,7 @@
           <a:p>
             <a:fld id="{5958763E-B898-436D-883D-03711491D54A}" type="datetimeFigureOut">
               <a:rPr lang="en-US" smtClean="0"/>
-              <a:t>3/24/2023</a:t>
+              <a:t>2/11/2025</a:t>
             </a:fld>
             <a:endParaRPr lang="en-US"/>
           </a:p>
@@ -32560,7 +32560,7 @@
           <a:p>
             <a:fld id="{5958763E-B898-436D-883D-03711491D54A}" type="datetimeFigureOut">
               <a:rPr lang="en-US" smtClean="0"/>
-              <a:t>3/24/2023</a:t>
+              <a:t>2/11/2025</a:t>
             </a:fld>
             <a:endParaRPr lang="en-US"/>
           </a:p>
@@ -32790,7 +32790,7 @@
           <a:p>
             <a:fld id="{5958763E-B898-436D-883D-03711491D54A}" type="datetimeFigureOut">
               <a:rPr lang="en-US" smtClean="0"/>
-              <a:t>3/24/2023</a:t>
+              <a:t>2/11/2025</a:t>
             </a:fld>
             <a:endParaRPr lang="en-US"/>
           </a:p>
@@ -33034,7 +33034,7 @@
           <a:p>
             <a:fld id="{5958763E-B898-436D-883D-03711491D54A}" type="datetimeFigureOut">
               <a:rPr lang="en-US" smtClean="0"/>
-              <a:t>3/24/2023</a:t>
+              <a:t>2/11/2025</a:t>
             </a:fld>
             <a:endParaRPr lang="en-US"/>
           </a:p>
@@ -36623,12 +36623,12 @@
               <a:buNone/>
             </a:pPr>
             <a:r>
-              <a:rPr lang="en-US" sz="11500" dirty="0">
+              <a:rPr lang="en-US" sz="13800" dirty="0">
                 <a:hlinkClick r:id="rId3"/>
               </a:rPr>
-              <a:t>https://replit.com/@HylandOutreach/ButtonExample</a:t>
+              <a:t>https://jsfiddle.net/tvn6598b/</a:t>
             </a:r>
-            <a:endParaRPr lang="en-US" sz="16600" dirty="0"/>
+            <a:endParaRPr lang="en-US" sz="13800" dirty="0"/>
           </a:p>
         </p:txBody>
       </p:sp>

</xml_diff>